<commit_message>
Income analysis and  PPT
</commit_message>
<xml_diff>
--- a/Niraj Kumar.pptx
+++ b/Niraj Kumar.pptx
@@ -5,20 +5,23 @@
     <p:sldMasterId id="2147483660" r:id="rId1"/>
   </p:sldMasterIdLst>
   <p:notesMasterIdLst>
-    <p:notesMasterId r:id="rId13"/>
+    <p:notesMasterId r:id="rId16"/>
   </p:notesMasterIdLst>
   <p:sldIdLst>
     <p:sldId id="256" r:id="rId2"/>
     <p:sldId id="257" r:id="rId3"/>
     <p:sldId id="258" r:id="rId4"/>
-    <p:sldId id="259" r:id="rId5"/>
-    <p:sldId id="260" r:id="rId6"/>
-    <p:sldId id="267" r:id="rId7"/>
-    <p:sldId id="270" r:id="rId8"/>
-    <p:sldId id="262" r:id="rId9"/>
-    <p:sldId id="268" r:id="rId10"/>
+    <p:sldId id="270" r:id="rId5"/>
+    <p:sldId id="259" r:id="rId6"/>
+    <p:sldId id="260" r:id="rId7"/>
+    <p:sldId id="267" r:id="rId8"/>
+    <p:sldId id="268" r:id="rId9"/>
+    <p:sldId id="262" r:id="rId10"/>
     <p:sldId id="269" r:id="rId11"/>
-    <p:sldId id="265" r:id="rId12"/>
+    <p:sldId id="271" r:id="rId12"/>
+    <p:sldId id="272" r:id="rId13"/>
+    <p:sldId id="273" r:id="rId14"/>
+    <p:sldId id="265" r:id="rId15"/>
   </p:sldIdLst>
   <p:sldSz cx="12192000" cy="6858000"/>
   <p:notesSz cx="6858000" cy="9144000"/>
@@ -3583,31 +3586,111 @@
           <a:bodyPr/>
           <a:lstStyle/>
           <a:p>
+            <a:r>
+              <a:rPr lang="en-US" sz="2800" dirty="0"/>
+              <a:t>Home Ownership Analysis</a:t>
+            </a:r>
             <a:endParaRPr lang="en-IN" sz="2800" dirty="0"/>
           </a:p>
         </p:txBody>
       </p:sp>
-      <p:sp>
-        <p:nvSpPr>
-          <p:cNvPr id="3" name="Content Placeholder 2">
+      <p:pic>
+        <p:nvPicPr>
+          <p:cNvPr id="4" name="Content Placeholder 3">
             <a:extLst>
               <a:ext uri="{FF2B5EF4-FFF2-40B4-BE49-F238E27FC236}">
-                <a16:creationId xmlns:a16="http://schemas.microsoft.com/office/drawing/2014/main" id="{CB0140AB-E4D8-4E45-B496-DE1D77885317}"/>
+                <a16:creationId xmlns:a16="http://schemas.microsoft.com/office/drawing/2014/main" id="{0C4315C2-F333-48C1-B688-63CE4ED20F60}"/>
               </a:ext>
             </a:extLst>
           </p:cNvPr>
-          <p:cNvSpPr>
-            <a:spLocks noGrp="1"/>
-          </p:cNvSpPr>
+          <p:cNvPicPr>
+            <a:picLocks noGrp="1" noChangeAspect="1"/>
+          </p:cNvPicPr>
           <p:nvPr>
             <p:ph idx="1"/>
           </p:nvPr>
-        </p:nvSpPr>
-        <p:spPr/>
-        <p:txBody>
-          <a:bodyPr/>
-          <a:lstStyle/>
-          <a:p>
+        </p:nvPicPr>
+        <p:blipFill>
+          <a:blip r:embed="rId2"/>
+          <a:stretch>
+            <a:fillRect/>
+          </a:stretch>
+        </p:blipFill>
+        <p:spPr>
+          <a:xfrm>
+            <a:off x="830548" y="1681247"/>
+            <a:ext cx="4228111" cy="3150812"/>
+          </a:xfrm>
+        </p:spPr>
+      </p:pic>
+      <p:pic>
+        <p:nvPicPr>
+          <p:cNvPr id="7" name="Picture 6">
+            <a:extLst>
+              <a:ext uri="{FF2B5EF4-FFF2-40B4-BE49-F238E27FC236}">
+                <a16:creationId xmlns:a16="http://schemas.microsoft.com/office/drawing/2014/main" id="{D46E9486-F0C4-4D95-A3D7-FBF29F4225A9}"/>
+              </a:ext>
+            </a:extLst>
+          </p:cNvPr>
+          <p:cNvPicPr>
+            <a:picLocks noChangeAspect="1"/>
+          </p:cNvPicPr>
+          <p:nvPr/>
+        </p:nvPicPr>
+        <p:blipFill>
+          <a:blip r:embed="rId3"/>
+          <a:stretch>
+            <a:fillRect/>
+          </a:stretch>
+        </p:blipFill>
+        <p:spPr>
+          <a:xfrm>
+            <a:off x="5355938" y="1672397"/>
+            <a:ext cx="6005514" cy="3272411"/>
+          </a:xfrm>
+          <a:prstGeom prst="rect">
+            <a:avLst/>
+          </a:prstGeom>
+        </p:spPr>
+      </p:pic>
+      <p:sp>
+        <p:nvSpPr>
+          <p:cNvPr id="8" name="TextBox 7">
+            <a:extLst>
+              <a:ext uri="{FF2B5EF4-FFF2-40B4-BE49-F238E27FC236}">
+                <a16:creationId xmlns:a16="http://schemas.microsoft.com/office/drawing/2014/main" id="{06334C71-E0E7-4C01-9659-897341C3BA4F}"/>
+              </a:ext>
+            </a:extLst>
+          </p:cNvPr>
+          <p:cNvSpPr txBox="1"/>
+          <p:nvPr/>
+        </p:nvSpPr>
+        <p:spPr>
+          <a:xfrm>
+            <a:off x="830548" y="5360565"/>
+            <a:ext cx="10133900" cy="923330"/>
+          </a:xfrm>
+          <a:prstGeom prst="rect">
+            <a:avLst/>
+          </a:prstGeom>
+          <a:noFill/>
+        </p:spPr>
+        <p:txBody>
+          <a:bodyPr wrap="square" rtlCol="0">
+            <a:spAutoFit/>
+          </a:bodyPr>
+          <a:lstStyle/>
+          <a:p>
+            <a:r>
+              <a:rPr lang="en-US" dirty="0"/>
+              <a:t>Observation:</a:t>
+            </a:r>
+          </a:p>
+          <a:p>
+            <a:r>
+              <a:rPr lang="en-US" dirty="0"/>
+              <a:t>- People with rent and mortgage commitment seems to take more loans. They also have higher number of defaulters. This </a:t>
+            </a:r>
             <a:endParaRPr lang="en-IN" dirty="0"/>
           </a:p>
         </p:txBody>
@@ -3644,6 +3727,624 @@
       </p:grpSpPr>
       <p:sp>
         <p:nvSpPr>
+          <p:cNvPr id="2" name="Title 1">
+            <a:extLst>
+              <a:ext uri="{FF2B5EF4-FFF2-40B4-BE49-F238E27FC236}">
+                <a16:creationId xmlns:a16="http://schemas.microsoft.com/office/drawing/2014/main" id="{6B6CD911-5B8F-432A-9218-17A369BCEF52}"/>
+              </a:ext>
+            </a:extLst>
+          </p:cNvPr>
+          <p:cNvSpPr>
+            <a:spLocks noGrp="1"/>
+          </p:cNvSpPr>
+          <p:nvPr>
+            <p:ph type="title"/>
+          </p:nvPr>
+        </p:nvSpPr>
+        <p:spPr/>
+        <p:txBody>
+          <a:bodyPr/>
+          <a:lstStyle/>
+          <a:p>
+            <a:r>
+              <a:rPr lang="en-US" dirty="0"/>
+              <a:t>Issued month and year analysis</a:t>
+            </a:r>
+            <a:endParaRPr lang="en-IN" dirty="0"/>
+          </a:p>
+        </p:txBody>
+      </p:sp>
+      <p:pic>
+        <p:nvPicPr>
+          <p:cNvPr id="1026" name="Picture 2">
+            <a:extLst>
+              <a:ext uri="{FF2B5EF4-FFF2-40B4-BE49-F238E27FC236}">
+                <a16:creationId xmlns:a16="http://schemas.microsoft.com/office/drawing/2014/main" id="{01FAB034-CDA1-4D2F-A575-60E0C500AB11}"/>
+              </a:ext>
+            </a:extLst>
+          </p:cNvPr>
+          <p:cNvPicPr>
+            <a:picLocks noGrp="1" noChangeAspect="1" noChangeArrowheads="1"/>
+          </p:cNvPicPr>
+          <p:nvPr>
+            <p:ph idx="1"/>
+          </p:nvPr>
+        </p:nvPicPr>
+        <p:blipFill>
+          <a:blip r:embed="rId2">
+            <a:extLst>
+              <a:ext uri="{28A0092B-C50C-407E-A947-70E740481C1C}">
+                <a14:useLocalDpi xmlns:a14="http://schemas.microsoft.com/office/drawing/2010/main" val="0"/>
+              </a:ext>
+            </a:extLst>
+          </a:blip>
+          <a:srcRect/>
+          <a:stretch>
+            <a:fillRect/>
+          </a:stretch>
+        </p:blipFill>
+        <p:spPr bwMode="auto">
+          <a:xfrm>
+            <a:off x="215075" y="1630567"/>
+            <a:ext cx="5524402" cy="3503495"/>
+          </a:xfrm>
+          <a:prstGeom prst="rect">
+            <a:avLst/>
+          </a:prstGeom>
+          <a:noFill/>
+          <a:extLst>
+            <a:ext uri="{909E8E84-426E-40DD-AFC4-6F175D3DCCD1}">
+              <a14:hiddenFill xmlns:a14="http://schemas.microsoft.com/office/drawing/2010/main">
+                <a:solidFill>
+                  <a:srgbClr val="FFFFFF"/>
+                </a:solidFill>
+              </a14:hiddenFill>
+            </a:ext>
+          </a:extLst>
+        </p:spPr>
+      </p:pic>
+      <p:pic>
+        <p:nvPicPr>
+          <p:cNvPr id="1028" name="Picture 4">
+            <a:extLst>
+              <a:ext uri="{FF2B5EF4-FFF2-40B4-BE49-F238E27FC236}">
+                <a16:creationId xmlns:a16="http://schemas.microsoft.com/office/drawing/2014/main" id="{3B3BFDB0-8388-408E-B6C9-D99720251F5F}"/>
+              </a:ext>
+            </a:extLst>
+          </p:cNvPr>
+          <p:cNvPicPr>
+            <a:picLocks noChangeAspect="1" noChangeArrowheads="1"/>
+          </p:cNvPicPr>
+          <p:nvPr/>
+        </p:nvPicPr>
+        <p:blipFill>
+          <a:blip r:embed="rId3">
+            <a:extLst>
+              <a:ext uri="{28A0092B-C50C-407E-A947-70E740481C1C}">
+                <a14:useLocalDpi xmlns:a14="http://schemas.microsoft.com/office/drawing/2010/main" val="0"/>
+              </a:ext>
+            </a:extLst>
+          </a:blip>
+          <a:srcRect/>
+          <a:stretch>
+            <a:fillRect/>
+          </a:stretch>
+        </p:blipFill>
+        <p:spPr bwMode="auto">
+          <a:xfrm>
+            <a:off x="5981350" y="1630567"/>
+            <a:ext cx="5595677" cy="3509453"/>
+          </a:xfrm>
+          <a:prstGeom prst="rect">
+            <a:avLst/>
+          </a:prstGeom>
+          <a:noFill/>
+          <a:extLst>
+            <a:ext uri="{909E8E84-426E-40DD-AFC4-6F175D3DCCD1}">
+              <a14:hiddenFill xmlns:a14="http://schemas.microsoft.com/office/drawing/2010/main">
+                <a:solidFill>
+                  <a:srgbClr val="FFFFFF"/>
+                </a:solidFill>
+              </a14:hiddenFill>
+            </a:ext>
+          </a:extLst>
+        </p:spPr>
+      </p:pic>
+      <p:sp>
+        <p:nvSpPr>
+          <p:cNvPr id="4" name="TextBox 3">
+            <a:extLst>
+              <a:ext uri="{FF2B5EF4-FFF2-40B4-BE49-F238E27FC236}">
+                <a16:creationId xmlns:a16="http://schemas.microsoft.com/office/drawing/2014/main" id="{D0F1BB20-0446-4AA6-B896-C23B970783BD}"/>
+              </a:ext>
+            </a:extLst>
+          </p:cNvPr>
+          <p:cNvSpPr txBox="1"/>
+          <p:nvPr/>
+        </p:nvSpPr>
+        <p:spPr>
+          <a:xfrm>
+            <a:off x="293615" y="5427677"/>
+            <a:ext cx="11283412" cy="923330"/>
+          </a:xfrm>
+          <a:prstGeom prst="rect">
+            <a:avLst/>
+          </a:prstGeom>
+          <a:noFill/>
+        </p:spPr>
+        <p:txBody>
+          <a:bodyPr wrap="square" rtlCol="0">
+            <a:spAutoFit/>
+          </a:bodyPr>
+          <a:lstStyle/>
+          <a:p>
+            <a:r>
+              <a:rPr lang="en-US" dirty="0"/>
+              <a:t>Observation:</a:t>
+            </a:r>
+          </a:p>
+          <a:p>
+            <a:pPr marL="285750" indent="-285750">
+              <a:buFontTx/>
+              <a:buChar char="-"/>
+            </a:pPr>
+            <a:r>
+              <a:rPr lang="en-US" dirty="0"/>
+              <a:t>The number of loans issued increases each year as well as through out the year.</a:t>
+            </a:r>
+          </a:p>
+          <a:p>
+            <a:pPr marL="285750" indent="-285750">
+              <a:buFontTx/>
+              <a:buChar char="-"/>
+            </a:pPr>
+            <a:r>
+              <a:rPr lang="en-US" dirty="0"/>
+              <a:t>The defaulter count remains consistent with the change in loan </a:t>
+            </a:r>
+            <a:r>
+              <a:rPr lang="en-US" dirty="0" err="1"/>
+              <a:t>applicaitions</a:t>
+            </a:r>
+            <a:r>
+              <a:rPr lang="en-US" dirty="0"/>
+              <a:t>.</a:t>
+            </a:r>
+          </a:p>
+        </p:txBody>
+      </p:sp>
+    </p:spTree>
+    <p:extLst>
+      <p:ext uri="{BB962C8B-B14F-4D97-AF65-F5344CB8AC3E}">
+        <p14:creationId xmlns:p14="http://schemas.microsoft.com/office/powerpoint/2010/main" val="90417832"/>
+      </p:ext>
+    </p:extLst>
+  </p:cSld>
+  <p:clrMapOvr>
+    <a:masterClrMapping/>
+  </p:clrMapOvr>
+</p:sld>
+</file>
+
+<file path=ppt/slides/slide12.xml><?xml version="1.0" encoding="utf-8"?>
+<p:sld xmlns:a="http://schemas.openxmlformats.org/drawingml/2006/main" xmlns:r="http://schemas.openxmlformats.org/officeDocument/2006/relationships" xmlns:p="http://schemas.openxmlformats.org/presentationml/2006/main">
+  <p:cSld>
+    <p:spTree>
+      <p:nvGrpSpPr>
+        <p:cNvPr id="1" name=""/>
+        <p:cNvGrpSpPr/>
+        <p:nvPr/>
+      </p:nvGrpSpPr>
+      <p:grpSpPr>
+        <a:xfrm>
+          <a:off x="0" y="0"/>
+          <a:ext cx="0" cy="0"/>
+          <a:chOff x="0" y="0"/>
+          <a:chExt cx="0" cy="0"/>
+        </a:xfrm>
+      </p:grpSpPr>
+      <p:sp>
+        <p:nvSpPr>
+          <p:cNvPr id="2" name="Title 1">
+            <a:extLst>
+              <a:ext uri="{FF2B5EF4-FFF2-40B4-BE49-F238E27FC236}">
+                <a16:creationId xmlns:a16="http://schemas.microsoft.com/office/drawing/2014/main" id="{C7CB33C7-BA72-4FBC-B266-AF37D9B23D1B}"/>
+              </a:ext>
+            </a:extLst>
+          </p:cNvPr>
+          <p:cNvSpPr>
+            <a:spLocks noGrp="1"/>
+          </p:cNvSpPr>
+          <p:nvPr>
+            <p:ph type="title"/>
+          </p:nvPr>
+        </p:nvSpPr>
+        <p:spPr/>
+        <p:txBody>
+          <a:bodyPr>
+            <a:normAutofit fontScale="90000"/>
+          </a:bodyPr>
+          <a:lstStyle/>
+          <a:p>
+            <a:r>
+              <a:rPr lang="en-US" dirty="0"/>
+              <a:t>Term, Debt to Income, and Verification Status Analysis</a:t>
+            </a:r>
+            <a:endParaRPr lang="en-IN" dirty="0"/>
+          </a:p>
+        </p:txBody>
+      </p:sp>
+      <p:pic>
+        <p:nvPicPr>
+          <p:cNvPr id="2050" name="Picture 2">
+            <a:extLst>
+              <a:ext uri="{FF2B5EF4-FFF2-40B4-BE49-F238E27FC236}">
+                <a16:creationId xmlns:a16="http://schemas.microsoft.com/office/drawing/2014/main" id="{4E8C239A-F203-461A-BA8E-C2FF48033E8C}"/>
+              </a:ext>
+            </a:extLst>
+          </p:cNvPr>
+          <p:cNvPicPr>
+            <a:picLocks noGrp="1" noChangeAspect="1" noChangeArrowheads="1"/>
+          </p:cNvPicPr>
+          <p:nvPr>
+            <p:ph idx="1"/>
+          </p:nvPr>
+        </p:nvPicPr>
+        <p:blipFill>
+          <a:blip r:embed="rId2">
+            <a:extLst>
+              <a:ext uri="{28A0092B-C50C-407E-A947-70E740481C1C}">
+                <a14:useLocalDpi xmlns:a14="http://schemas.microsoft.com/office/drawing/2010/main" val="0"/>
+              </a:ext>
+            </a:extLst>
+          </a:blip>
+          <a:srcRect/>
+          <a:stretch>
+            <a:fillRect/>
+          </a:stretch>
+        </p:blipFill>
+        <p:spPr bwMode="auto">
+          <a:xfrm>
+            <a:off x="1196723" y="1526096"/>
+            <a:ext cx="5514469" cy="3301587"/>
+          </a:xfrm>
+          <a:prstGeom prst="rect">
+            <a:avLst/>
+          </a:prstGeom>
+          <a:noFill/>
+          <a:extLst>
+            <a:ext uri="{909E8E84-426E-40DD-AFC4-6F175D3DCCD1}">
+              <a14:hiddenFill xmlns:a14="http://schemas.microsoft.com/office/drawing/2010/main">
+                <a:solidFill>
+                  <a:srgbClr val="FFFFFF"/>
+                </a:solidFill>
+              </a14:hiddenFill>
+            </a:ext>
+          </a:extLst>
+        </p:spPr>
+      </p:pic>
+      <p:pic>
+        <p:nvPicPr>
+          <p:cNvPr id="2052" name="Picture 4">
+            <a:extLst>
+              <a:ext uri="{FF2B5EF4-FFF2-40B4-BE49-F238E27FC236}">
+                <a16:creationId xmlns:a16="http://schemas.microsoft.com/office/drawing/2014/main" id="{16D85C63-93FF-4D1C-A0F9-7FB66EF75CFF}"/>
+              </a:ext>
+            </a:extLst>
+          </p:cNvPr>
+          <p:cNvPicPr>
+            <a:picLocks noChangeAspect="1" noChangeArrowheads="1"/>
+          </p:cNvPicPr>
+          <p:nvPr/>
+        </p:nvPicPr>
+        <p:blipFill>
+          <a:blip r:embed="rId3">
+            <a:extLst>
+              <a:ext uri="{28A0092B-C50C-407E-A947-70E740481C1C}">
+                <a14:useLocalDpi xmlns:a14="http://schemas.microsoft.com/office/drawing/2010/main" val="0"/>
+              </a:ext>
+            </a:extLst>
+          </a:blip>
+          <a:srcRect/>
+          <a:stretch>
+            <a:fillRect/>
+          </a:stretch>
+        </p:blipFill>
+        <p:spPr bwMode="auto">
+          <a:xfrm>
+            <a:off x="7614158" y="1526096"/>
+            <a:ext cx="3724275" cy="2476500"/>
+          </a:xfrm>
+          <a:prstGeom prst="rect">
+            <a:avLst/>
+          </a:prstGeom>
+          <a:noFill/>
+          <a:extLst>
+            <a:ext uri="{909E8E84-426E-40DD-AFC4-6F175D3DCCD1}">
+              <a14:hiddenFill xmlns:a14="http://schemas.microsoft.com/office/drawing/2010/main">
+                <a:solidFill>
+                  <a:srgbClr val="FFFFFF"/>
+                </a:solidFill>
+              </a14:hiddenFill>
+            </a:ext>
+          </a:extLst>
+        </p:spPr>
+      </p:pic>
+      <p:pic>
+        <p:nvPicPr>
+          <p:cNvPr id="2054" name="Picture 6">
+            <a:extLst>
+              <a:ext uri="{FF2B5EF4-FFF2-40B4-BE49-F238E27FC236}">
+                <a16:creationId xmlns:a16="http://schemas.microsoft.com/office/drawing/2014/main" id="{331DED02-BDBC-4F71-BC73-E3FF4AB37203}"/>
+              </a:ext>
+            </a:extLst>
+          </p:cNvPr>
+          <p:cNvPicPr>
+            <a:picLocks noChangeAspect="1" noChangeArrowheads="1"/>
+          </p:cNvPicPr>
+          <p:nvPr/>
+        </p:nvPicPr>
+        <p:blipFill>
+          <a:blip r:embed="rId4">
+            <a:extLst>
+              <a:ext uri="{28A0092B-C50C-407E-A947-70E740481C1C}">
+                <a14:useLocalDpi xmlns:a14="http://schemas.microsoft.com/office/drawing/2010/main" val="0"/>
+              </a:ext>
+            </a:extLst>
+          </a:blip>
+          <a:srcRect/>
+          <a:stretch>
+            <a:fillRect/>
+          </a:stretch>
+        </p:blipFill>
+        <p:spPr bwMode="auto">
+          <a:xfrm>
+            <a:off x="7585584" y="4093654"/>
+            <a:ext cx="3781425" cy="2476500"/>
+          </a:xfrm>
+          <a:prstGeom prst="rect">
+            <a:avLst/>
+          </a:prstGeom>
+          <a:noFill/>
+          <a:extLst>
+            <a:ext uri="{909E8E84-426E-40DD-AFC4-6F175D3DCCD1}">
+              <a14:hiddenFill xmlns:a14="http://schemas.microsoft.com/office/drawing/2010/main">
+                <a:solidFill>
+                  <a:srgbClr val="FFFFFF"/>
+                </a:solidFill>
+              </a14:hiddenFill>
+            </a:ext>
+          </a:extLst>
+        </p:spPr>
+      </p:pic>
+      <p:sp>
+        <p:nvSpPr>
+          <p:cNvPr id="4" name="TextBox 3">
+            <a:extLst>
+              <a:ext uri="{FF2B5EF4-FFF2-40B4-BE49-F238E27FC236}">
+                <a16:creationId xmlns:a16="http://schemas.microsoft.com/office/drawing/2014/main" id="{DEF206DC-DF5F-47ED-AC88-4BEC6F04337B}"/>
+              </a:ext>
+            </a:extLst>
+          </p:cNvPr>
+          <p:cNvSpPr txBox="1"/>
+          <p:nvPr/>
+        </p:nvSpPr>
+        <p:spPr>
+          <a:xfrm>
+            <a:off x="855676" y="5041782"/>
+            <a:ext cx="6040073" cy="1200329"/>
+          </a:xfrm>
+          <a:prstGeom prst="rect">
+            <a:avLst/>
+          </a:prstGeom>
+          <a:noFill/>
+        </p:spPr>
+        <p:txBody>
+          <a:bodyPr wrap="square" rtlCol="0">
+            <a:spAutoFit/>
+          </a:bodyPr>
+          <a:lstStyle/>
+          <a:p>
+            <a:r>
+              <a:rPr lang="en-US" dirty="0"/>
+              <a:t>Observation:</a:t>
+            </a:r>
+          </a:p>
+          <a:p>
+            <a:r>
+              <a:rPr lang="en-US" dirty="0"/>
+              <a:t>- The standout point is that the percent of defaulters for the 60 month term is considerably higher. This is another variable to look out for.</a:t>
+            </a:r>
+            <a:endParaRPr lang="en-IN" dirty="0"/>
+          </a:p>
+        </p:txBody>
+      </p:sp>
+    </p:spTree>
+    <p:extLst>
+      <p:ext uri="{BB962C8B-B14F-4D97-AF65-F5344CB8AC3E}">
+        <p14:creationId xmlns:p14="http://schemas.microsoft.com/office/powerpoint/2010/main" val="1290499540"/>
+      </p:ext>
+    </p:extLst>
+  </p:cSld>
+  <p:clrMapOvr>
+    <a:masterClrMapping/>
+  </p:clrMapOvr>
+</p:sld>
+</file>
+
+<file path=ppt/slides/slide13.xml><?xml version="1.0" encoding="utf-8"?>
+<p:sld xmlns:a="http://schemas.openxmlformats.org/drawingml/2006/main" xmlns:r="http://schemas.openxmlformats.org/officeDocument/2006/relationships" xmlns:p="http://schemas.openxmlformats.org/presentationml/2006/main">
+  <p:cSld>
+    <p:spTree>
+      <p:nvGrpSpPr>
+        <p:cNvPr id="1" name=""/>
+        <p:cNvGrpSpPr/>
+        <p:nvPr/>
+      </p:nvGrpSpPr>
+      <p:grpSpPr>
+        <a:xfrm>
+          <a:off x="0" y="0"/>
+          <a:ext cx="0" cy="0"/>
+          <a:chOff x="0" y="0"/>
+          <a:chExt cx="0" cy="0"/>
+        </a:xfrm>
+      </p:grpSpPr>
+      <p:sp>
+        <p:nvSpPr>
+          <p:cNvPr id="2" name="Title 1">
+            <a:extLst>
+              <a:ext uri="{FF2B5EF4-FFF2-40B4-BE49-F238E27FC236}">
+                <a16:creationId xmlns:a16="http://schemas.microsoft.com/office/drawing/2014/main" id="{2EBB9BA7-39A6-4A6E-A525-173D91CA455F}"/>
+              </a:ext>
+            </a:extLst>
+          </p:cNvPr>
+          <p:cNvSpPr>
+            <a:spLocks noGrp="1"/>
+          </p:cNvSpPr>
+          <p:nvPr>
+            <p:ph type="title"/>
+          </p:nvPr>
+        </p:nvSpPr>
+        <p:spPr/>
+        <p:txBody>
+          <a:bodyPr/>
+          <a:lstStyle/>
+          <a:p>
+            <a:r>
+              <a:rPr lang="en-US" dirty="0"/>
+              <a:t>Analysis by state</a:t>
+            </a:r>
+            <a:endParaRPr lang="en-IN" dirty="0"/>
+          </a:p>
+        </p:txBody>
+      </p:sp>
+      <p:sp>
+        <p:nvSpPr>
+          <p:cNvPr id="3" name="Content Placeholder 2">
+            <a:extLst>
+              <a:ext uri="{FF2B5EF4-FFF2-40B4-BE49-F238E27FC236}">
+                <a16:creationId xmlns:a16="http://schemas.microsoft.com/office/drawing/2014/main" id="{3DD00F2D-C93C-444F-A28D-166614A8AC86}"/>
+              </a:ext>
+            </a:extLst>
+          </p:cNvPr>
+          <p:cNvSpPr>
+            <a:spLocks noGrp="1"/>
+          </p:cNvSpPr>
+          <p:nvPr>
+            <p:ph idx="1"/>
+          </p:nvPr>
+        </p:nvSpPr>
+        <p:spPr>
+          <a:xfrm>
+            <a:off x="404949" y="2181138"/>
+            <a:ext cx="5802904" cy="4018049"/>
+          </a:xfrm>
+        </p:spPr>
+        <p:txBody>
+          <a:bodyPr/>
+          <a:lstStyle/>
+          <a:p>
+            <a:r>
+              <a:rPr lang="en-US" dirty="0"/>
+              <a:t>Observation:</a:t>
+            </a:r>
+          </a:p>
+          <a:p>
+            <a:pPr lvl="1"/>
+            <a:r>
+              <a:rPr lang="en-US" dirty="0"/>
+              <a:t>California(CA) has the highest number of defaulters. This should be considered during the loan approval.</a:t>
+            </a:r>
+          </a:p>
+          <a:p>
+            <a:pPr lvl="1"/>
+            <a:r>
+              <a:rPr lang="en-US" dirty="0"/>
+              <a:t>Florida(FL) and New York(NY) also have high number of defaulters and should be considered during the approval process.</a:t>
+            </a:r>
+            <a:endParaRPr lang="en-IN" dirty="0"/>
+          </a:p>
+        </p:txBody>
+      </p:sp>
+      <p:pic>
+        <p:nvPicPr>
+          <p:cNvPr id="3074" name="Picture 2">
+            <a:extLst>
+              <a:ext uri="{FF2B5EF4-FFF2-40B4-BE49-F238E27FC236}">
+                <a16:creationId xmlns:a16="http://schemas.microsoft.com/office/drawing/2014/main" id="{B68F4D63-FB43-4825-A5DE-B4E4CA29EA65}"/>
+              </a:ext>
+            </a:extLst>
+          </p:cNvPr>
+          <p:cNvPicPr>
+            <a:picLocks noChangeAspect="1" noChangeArrowheads="1"/>
+          </p:cNvPicPr>
+          <p:nvPr/>
+        </p:nvPicPr>
+        <p:blipFill>
+          <a:blip r:embed="rId2">
+            <a:extLst>
+              <a:ext uri="{28A0092B-C50C-407E-A947-70E740481C1C}">
+                <a14:useLocalDpi xmlns:a14="http://schemas.microsoft.com/office/drawing/2010/main" val="0"/>
+              </a:ext>
+            </a:extLst>
+          </a:blip>
+          <a:srcRect/>
+          <a:stretch>
+            <a:fillRect/>
+          </a:stretch>
+        </p:blipFill>
+        <p:spPr bwMode="auto">
+          <a:xfrm>
+            <a:off x="6543414" y="1496218"/>
+            <a:ext cx="5092636" cy="4911051"/>
+          </a:xfrm>
+          <a:prstGeom prst="rect">
+            <a:avLst/>
+          </a:prstGeom>
+          <a:noFill/>
+          <a:extLst>
+            <a:ext uri="{909E8E84-426E-40DD-AFC4-6F175D3DCCD1}">
+              <a14:hiddenFill xmlns:a14="http://schemas.microsoft.com/office/drawing/2010/main">
+                <a:solidFill>
+                  <a:srgbClr val="FFFFFF"/>
+                </a:solidFill>
+              </a14:hiddenFill>
+            </a:ext>
+          </a:extLst>
+        </p:spPr>
+      </p:pic>
+    </p:spTree>
+    <p:extLst>
+      <p:ext uri="{BB962C8B-B14F-4D97-AF65-F5344CB8AC3E}">
+        <p14:creationId xmlns:p14="http://schemas.microsoft.com/office/powerpoint/2010/main" val="2792648685"/>
+      </p:ext>
+    </p:extLst>
+  </p:cSld>
+  <p:clrMapOvr>
+    <a:masterClrMapping/>
+  </p:clrMapOvr>
+</p:sld>
+</file>
+
+<file path=ppt/slides/slide14.xml><?xml version="1.0" encoding="utf-8"?>
+<p:sld xmlns:a="http://schemas.openxmlformats.org/drawingml/2006/main" xmlns:r="http://schemas.openxmlformats.org/officeDocument/2006/relationships" xmlns:p="http://schemas.openxmlformats.org/presentationml/2006/main">
+  <p:cSld>
+    <p:spTree>
+      <p:nvGrpSpPr>
+        <p:cNvPr id="1" name=""/>
+        <p:cNvGrpSpPr/>
+        <p:nvPr/>
+      </p:nvGrpSpPr>
+      <p:grpSpPr>
+        <a:xfrm>
+          <a:off x="0" y="0"/>
+          <a:ext cx="0" cy="0"/>
+          <a:chOff x="0" y="0"/>
+          <a:chExt cx="0" cy="0"/>
+        </a:xfrm>
+      </p:grpSpPr>
+      <p:sp>
+        <p:nvSpPr>
           <p:cNvPr id="5" name="Title 1"/>
           <p:cNvSpPr>
             <a:spLocks noGrp="1"/>
@@ -3696,8 +4397,89 @@
           </a:xfrm>
         </p:spPr>
         <p:txBody>
-          <a:bodyPr/>
-          <a:lstStyle/>
+          <a:bodyPr>
+            <a:normAutofit fontScale="92500"/>
+          </a:bodyPr>
+          <a:lstStyle/>
+          <a:p>
+            <a:pPr marL="0" indent="0" algn="l">
+              <a:buNone/>
+            </a:pPr>
+            <a:r>
+              <a:rPr lang="en-US" b="1" i="0" dirty="0">
+                <a:solidFill>
+                  <a:srgbClr val="000000"/>
+                </a:solidFill>
+                <a:effectLst/>
+                <a:latin typeface="Helvetica Neue"/>
+              </a:rPr>
+              <a:t>To conclude the following variable stands out when trying to identify defaulters:</a:t>
+            </a:r>
+          </a:p>
+          <a:p>
+            <a:pPr algn="l">
+              <a:buFont typeface="+mj-lt"/>
+              <a:buAutoNum type="arabicPeriod"/>
+            </a:pPr>
+            <a:r>
+              <a:rPr lang="en-US" b="0" i="0" dirty="0">
+                <a:solidFill>
+                  <a:srgbClr val="000000"/>
+                </a:solidFill>
+                <a:effectLst/>
+                <a:latin typeface="Helvetica Neue"/>
+              </a:rPr>
+              <a:t>Purpose: debt consolidation had more defaulters compared to others.</a:t>
+            </a:r>
+          </a:p>
+          <a:p>
+            <a:pPr algn="l">
+              <a:buFont typeface="+mj-lt"/>
+              <a:buAutoNum type="arabicPeriod"/>
+            </a:pPr>
+            <a:r>
+              <a:rPr lang="en-US" b="0" i="0" dirty="0">
+                <a:solidFill>
+                  <a:srgbClr val="000000"/>
+                </a:solidFill>
+                <a:effectLst/>
+                <a:latin typeface="Helvetica Neue"/>
+              </a:rPr>
+              <a:t>Address state: Applicants from California particularly were highly likely to default. Florida and New York also showed higher number of defaulters.</a:t>
+            </a:r>
+          </a:p>
+          <a:p>
+            <a:pPr algn="l">
+              <a:buFont typeface="+mj-lt"/>
+              <a:buAutoNum type="arabicPeriod"/>
+            </a:pPr>
+            <a:r>
+              <a:rPr lang="en-US" b="0" i="0" dirty="0">
+                <a:solidFill>
+                  <a:srgbClr val="000000"/>
+                </a:solidFill>
+                <a:effectLst/>
+                <a:latin typeface="Helvetica Neue"/>
+              </a:rPr>
+              <a:t>Interest rate: The applicants were more likely to default with higher interest rates.</a:t>
+            </a:r>
+          </a:p>
+          <a:p>
+            <a:pPr algn="l">
+              <a:buFont typeface="+mj-lt"/>
+              <a:buAutoNum type="arabicPeriod"/>
+            </a:pPr>
+            <a:r>
+              <a:rPr lang="en-US" b="0" i="0" dirty="0">
+                <a:solidFill>
+                  <a:srgbClr val="000000"/>
+                </a:solidFill>
+                <a:effectLst/>
+                <a:latin typeface="Helvetica Neue"/>
+              </a:rPr>
+              <a:t>Term: The percent of defaulters were higher for loans with 60 month term.</a:t>
+            </a:r>
+          </a:p>
           <a:p>
             <a:endParaRPr lang="en-IN" dirty="0"/>
           </a:p>
@@ -4621,163 +5403,63 @@
           <a:lstStyle/>
           <a:p>
             <a:r>
-              <a:rPr lang="en-IN" b="1" dirty="0"/>
-              <a:t> </a:t>
-            </a:r>
-            <a:r>
-              <a:rPr lang="en-IN" dirty="0"/>
-              <a:t>Loan Status Analysis</a:t>
-            </a:r>
-          </a:p>
-        </p:txBody>
-      </p:sp>
-      <p:pic>
-        <p:nvPicPr>
-          <p:cNvPr id="5" name="Content Placeholder 4">
+              <a:rPr lang="en-IN" sz="2800" dirty="0"/>
+              <a:t> Data Cleaning</a:t>
+            </a:r>
+          </a:p>
+        </p:txBody>
+      </p:sp>
+      <p:sp>
+        <p:nvSpPr>
+          <p:cNvPr id="4" name="Content Placeholder 3">
             <a:extLst>
               <a:ext uri="{FF2B5EF4-FFF2-40B4-BE49-F238E27FC236}">
-                <a16:creationId xmlns:a16="http://schemas.microsoft.com/office/drawing/2014/main" id="{AEEFBD06-94E1-4307-AB15-63D12BFB9D50}"/>
+                <a16:creationId xmlns:a16="http://schemas.microsoft.com/office/drawing/2014/main" id="{2CFE4B77-DC67-4641-91BC-DD355A315C79}"/>
               </a:ext>
             </a:extLst>
           </p:cNvPr>
-          <p:cNvPicPr>
-            <a:picLocks noGrp="1" noChangeAspect="1"/>
-          </p:cNvPicPr>
+          <p:cNvSpPr>
+            <a:spLocks noGrp="1"/>
+          </p:cNvSpPr>
           <p:nvPr>
             <p:ph idx="1"/>
           </p:nvPr>
-        </p:nvPicPr>
-        <p:blipFill>
-          <a:blip r:embed="rId2"/>
-          <a:stretch>
-            <a:fillRect/>
-          </a:stretch>
-        </p:blipFill>
-        <p:spPr>
-          <a:xfrm>
-            <a:off x="0" y="1536319"/>
-            <a:ext cx="5666792" cy="3785361"/>
-          </a:xfrm>
-        </p:spPr>
-      </p:pic>
-      <p:sp>
-        <p:nvSpPr>
-          <p:cNvPr id="7" name="TextBox 6">
-            <a:extLst>
-              <a:ext uri="{FF2B5EF4-FFF2-40B4-BE49-F238E27FC236}">
-                <a16:creationId xmlns:a16="http://schemas.microsoft.com/office/drawing/2014/main" id="{993BC4C2-1B91-43CB-BB68-2FA23CB69905}"/>
-              </a:ext>
-            </a:extLst>
-          </p:cNvPr>
-          <p:cNvSpPr txBox="1"/>
-          <p:nvPr/>
-        </p:nvSpPr>
-        <p:spPr>
-          <a:xfrm>
-            <a:off x="429210" y="5150603"/>
-            <a:ext cx="6096000" cy="1200329"/>
-          </a:xfrm>
-          <a:prstGeom prst="rect">
-            <a:avLst/>
-          </a:prstGeom>
-          <a:noFill/>
-        </p:spPr>
-        <p:txBody>
-          <a:bodyPr wrap="square">
-            <a:spAutoFit/>
-          </a:bodyPr>
-          <a:lstStyle/>
-          <a:p>
-            <a:pPr algn="l"/>
-            <a:r>
-              <a:rPr lang="en-IN" sz="1800" b="1" i="0" u="none" strike="noStrike" baseline="0" dirty="0">
-                <a:latin typeface="Calibri-Bold"/>
-              </a:rPr>
-              <a:t>Observations:</a:t>
-            </a:r>
-          </a:p>
-          <a:p>
-            <a:pPr algn="l"/>
-            <a:r>
-              <a:rPr lang="en-US" sz="1400" b="0" i="0" u="none" strike="noStrike" baseline="0" dirty="0">
-                <a:latin typeface="ArialMT"/>
-              </a:rPr>
-              <a:t>1. </a:t>
-            </a:r>
-            <a:r>
-              <a:rPr lang="en-US" sz="1800" b="0" i="0" u="none" strike="noStrike" baseline="0" dirty="0">
-                <a:latin typeface="Calibri" panose="020F0502020204030204" pitchFamily="34" charset="0"/>
-              </a:rPr>
-              <a:t>Most of the loans are Fully Paid.</a:t>
-            </a:r>
-          </a:p>
-          <a:p>
-            <a:pPr algn="l"/>
-            <a:r>
-              <a:rPr lang="en-US" sz="1400" b="0" i="0" u="none" strike="noStrike" baseline="0" dirty="0">
-                <a:latin typeface="ArialMT"/>
-              </a:rPr>
-              <a:t>2. </a:t>
-            </a:r>
-            <a:r>
-              <a:rPr lang="en-US" sz="1800" b="0" i="0" u="none" strike="noStrike" baseline="0" dirty="0">
-                <a:latin typeface="Calibri" panose="020F0502020204030204" pitchFamily="34" charset="0"/>
-              </a:rPr>
-              <a:t>About 14% of loan are having status as defaulters.</a:t>
-            </a:r>
-          </a:p>
-          <a:p>
-            <a:pPr algn="l"/>
-            <a:r>
-              <a:rPr lang="en-US" sz="1400" b="0" i="0" u="none" strike="noStrike" baseline="0" dirty="0">
-                <a:latin typeface="ArialMT"/>
-              </a:rPr>
-              <a:t>3. </a:t>
-            </a:r>
-            <a:r>
-              <a:rPr lang="en-US" sz="1800" b="0" i="0" u="none" strike="noStrike" baseline="0" dirty="0">
-                <a:latin typeface="Calibri" panose="020F0502020204030204" pitchFamily="34" charset="0"/>
-              </a:rPr>
-              <a:t>The loan has been increasing exponentially over the years.</a:t>
+        </p:nvSpPr>
+        <p:spPr/>
+        <p:txBody>
+          <a:bodyPr/>
+          <a:lstStyle/>
+          <a:p>
+            <a:r>
+              <a:rPr lang="en-US" dirty="0"/>
+              <a:t>We have removed all variables with mostly missing data. </a:t>
+            </a:r>
+          </a:p>
+          <a:p>
+            <a:r>
+              <a:rPr lang="en-US" dirty="0"/>
+              <a:t>We have also customer behavior columns such as revolving balance, next payment date, etc. as these details are not available at the time of application.</a:t>
+            </a:r>
+          </a:p>
+          <a:p>
+            <a:r>
+              <a:rPr lang="en-US" dirty="0"/>
+              <a:t>All current loans were not included in the analysis as the loan term is still in process and the data won’t yield any meaning full information.</a:t>
+            </a:r>
+          </a:p>
+          <a:p>
+            <a:r>
+              <a:rPr lang="en-US" dirty="0"/>
+              <a:t>For categorical variables with some missing values, we have considered them as a separate category.</a:t>
             </a:r>
             <a:endParaRPr lang="en-IN" dirty="0"/>
           </a:p>
         </p:txBody>
       </p:sp>
-      <p:pic>
-        <p:nvPicPr>
-          <p:cNvPr id="9" name="Picture 8">
-            <a:extLst>
-              <a:ext uri="{FF2B5EF4-FFF2-40B4-BE49-F238E27FC236}">
-                <a16:creationId xmlns:a16="http://schemas.microsoft.com/office/drawing/2014/main" id="{ABEFD63E-239D-43FD-8A0B-744FA3A81EC0}"/>
-              </a:ext>
-            </a:extLst>
-          </p:cNvPr>
-          <p:cNvPicPr>
-            <a:picLocks noChangeAspect="1"/>
-          </p:cNvPicPr>
-          <p:nvPr/>
-        </p:nvPicPr>
-        <p:blipFill>
-          <a:blip r:embed="rId3"/>
-          <a:stretch>
-            <a:fillRect/>
-          </a:stretch>
-        </p:blipFill>
-        <p:spPr>
-          <a:xfrm>
-            <a:off x="6433360" y="1365241"/>
-            <a:ext cx="5567673" cy="3785362"/>
-          </a:xfrm>
-          <a:prstGeom prst="rect">
-            <a:avLst/>
-          </a:prstGeom>
-        </p:spPr>
-      </p:pic>
     </p:spTree>
     <p:extLst>
       <p:ext uri="{BB962C8B-B14F-4D97-AF65-F5344CB8AC3E}">
-        <p14:creationId xmlns:p14="http://schemas.microsoft.com/office/powerpoint/2010/main" val="3095347154"/>
+        <p14:creationId xmlns:p14="http://schemas.microsoft.com/office/powerpoint/2010/main" val="3584251631"/>
       </p:ext>
     </p:extLst>
   </p:cSld>
@@ -4816,9 +5498,7 @@
         </p:nvSpPr>
         <p:spPr/>
         <p:txBody>
-          <a:bodyPr>
-            <a:normAutofit/>
-          </a:bodyPr>
+          <a:bodyPr/>
           <a:lstStyle/>
           <a:p>
             <a:r>
@@ -4826,8 +5506,8 @@
               <a:t> </a:t>
             </a:r>
             <a:r>
-              <a:rPr lang="en-IN" sz="2800" dirty="0"/>
-              <a:t>Loan Grade Analysis </a:t>
+              <a:rPr lang="en-IN" dirty="0"/>
+              <a:t>Loan Status Analysis</a:t>
             </a:r>
           </a:p>
         </p:txBody>
@@ -4837,7 +5517,7 @@
           <p:cNvPr id="5" name="Content Placeholder 4">
             <a:extLst>
               <a:ext uri="{FF2B5EF4-FFF2-40B4-BE49-F238E27FC236}">
-                <a16:creationId xmlns:a16="http://schemas.microsoft.com/office/drawing/2014/main" id="{54B3CBCF-29D9-4F51-95DF-4B02FCBD8839}"/>
+                <a16:creationId xmlns:a16="http://schemas.microsoft.com/office/drawing/2014/main" id="{AEEFBD06-94E1-4307-AB15-63D12BFB9D50}"/>
               </a:ext>
             </a:extLst>
           </p:cNvPr>
@@ -4856,17 +5536,101 @@
         </p:blipFill>
         <p:spPr>
           <a:xfrm>
-            <a:off x="709127" y="1496218"/>
-            <a:ext cx="4584136" cy="3305937"/>
+            <a:off x="0" y="1536319"/>
+            <a:ext cx="5666792" cy="3785361"/>
           </a:xfrm>
         </p:spPr>
       </p:pic>
+      <p:sp>
+        <p:nvSpPr>
+          <p:cNvPr id="7" name="TextBox 6">
+            <a:extLst>
+              <a:ext uri="{FF2B5EF4-FFF2-40B4-BE49-F238E27FC236}">
+                <a16:creationId xmlns:a16="http://schemas.microsoft.com/office/drawing/2014/main" id="{993BC4C2-1B91-43CB-BB68-2FA23CB69905}"/>
+              </a:ext>
+            </a:extLst>
+          </p:cNvPr>
+          <p:cNvSpPr txBox="1"/>
+          <p:nvPr/>
+        </p:nvSpPr>
+        <p:spPr>
+          <a:xfrm>
+            <a:off x="429210" y="5150603"/>
+            <a:ext cx="6096000" cy="1200329"/>
+          </a:xfrm>
+          <a:prstGeom prst="rect">
+            <a:avLst/>
+          </a:prstGeom>
+          <a:noFill/>
+        </p:spPr>
+        <p:txBody>
+          <a:bodyPr wrap="square">
+            <a:spAutoFit/>
+          </a:bodyPr>
+          <a:lstStyle/>
+          <a:p>
+            <a:pPr algn="l"/>
+            <a:r>
+              <a:rPr lang="en-IN" sz="1800" b="1" i="0" u="none" strike="noStrike" baseline="0" dirty="0">
+                <a:latin typeface="Calibri-Bold"/>
+              </a:rPr>
+              <a:t>Observations:</a:t>
+            </a:r>
+          </a:p>
+          <a:p>
+            <a:pPr algn="l"/>
+            <a:r>
+              <a:rPr lang="en-US" sz="1400" b="0" i="0" u="none" strike="noStrike" baseline="0" dirty="0">
+                <a:latin typeface="ArialMT"/>
+              </a:rPr>
+              <a:t>1. </a:t>
+            </a:r>
+            <a:r>
+              <a:rPr lang="en-US" sz="1800" b="0" i="0" u="none" strike="noStrike" baseline="0" dirty="0">
+                <a:latin typeface="Calibri" panose="020F0502020204030204" pitchFamily="34" charset="0"/>
+              </a:rPr>
+              <a:t>Most of the loans are Fully Paid.</a:t>
+            </a:r>
+          </a:p>
+          <a:p>
+            <a:pPr algn="l"/>
+            <a:r>
+              <a:rPr lang="en-US" sz="1400" b="0" i="0" u="none" strike="noStrike" baseline="0" dirty="0">
+                <a:latin typeface="ArialMT"/>
+              </a:rPr>
+              <a:t>2. </a:t>
+            </a:r>
+            <a:r>
+              <a:rPr lang="en-US" sz="1800" b="0" i="0" u="none" strike="noStrike" baseline="0" dirty="0">
+                <a:latin typeface="Calibri" panose="020F0502020204030204" pitchFamily="34" charset="0"/>
+              </a:rPr>
+              <a:t>About 14% of loan are having status as defaulters.</a:t>
+            </a:r>
+          </a:p>
+          <a:p>
+            <a:pPr algn="l"/>
+            <a:r>
+              <a:rPr lang="en-US" sz="1400" b="0" i="0" u="none" strike="noStrike" baseline="0" dirty="0">
+                <a:latin typeface="ArialMT"/>
+              </a:rPr>
+              <a:t>3. </a:t>
+            </a:r>
+            <a:r>
+              <a:rPr lang="en-US" sz="1800" b="0" i="0" u="none" strike="noStrike" baseline="0" dirty="0">
+                <a:latin typeface="Calibri" panose="020F0502020204030204" pitchFamily="34" charset="0"/>
+              </a:rPr>
+              <a:t>The loan has been increasing exponentially over the years.</a:t>
+            </a:r>
+            <a:endParaRPr lang="en-IN" dirty="0"/>
+          </a:p>
+        </p:txBody>
+      </p:sp>
       <p:pic>
         <p:nvPicPr>
-          <p:cNvPr id="7" name="Picture 6">
+          <p:cNvPr id="9" name="Picture 8">
             <a:extLst>
               <a:ext uri="{FF2B5EF4-FFF2-40B4-BE49-F238E27FC236}">
-                <a16:creationId xmlns:a16="http://schemas.microsoft.com/office/drawing/2014/main" id="{B3592E15-51C0-4786-BBF4-1C66EE8FF696}"/>
+                <a16:creationId xmlns:a16="http://schemas.microsoft.com/office/drawing/2014/main" id="{ABEFD63E-239D-43FD-8A0B-744FA3A81EC0}"/>
               </a:ext>
             </a:extLst>
           </p:cNvPr>
@@ -4883,162 +5647,18 @@
         </p:blipFill>
         <p:spPr>
           <a:xfrm>
-            <a:off x="6769981" y="1155236"/>
-            <a:ext cx="4712892" cy="2632994"/>
+            <a:off x="6433360" y="1365241"/>
+            <a:ext cx="5567673" cy="3785362"/>
           </a:xfrm>
           <a:prstGeom prst="rect">
             <a:avLst/>
           </a:prstGeom>
         </p:spPr>
       </p:pic>
-      <p:pic>
-        <p:nvPicPr>
-          <p:cNvPr id="9" name="Picture 8">
-            <a:extLst>
-              <a:ext uri="{FF2B5EF4-FFF2-40B4-BE49-F238E27FC236}">
-                <a16:creationId xmlns:a16="http://schemas.microsoft.com/office/drawing/2014/main" id="{77BAF88E-D024-42A0-B881-EAF1ED1EC857}"/>
-              </a:ext>
-            </a:extLst>
-          </p:cNvPr>
-          <p:cNvPicPr>
-            <a:picLocks noChangeAspect="1"/>
-          </p:cNvPicPr>
-          <p:nvPr/>
-        </p:nvPicPr>
-        <p:blipFill>
-          <a:blip r:embed="rId4"/>
-          <a:stretch>
-            <a:fillRect/>
-          </a:stretch>
-        </p:blipFill>
-        <p:spPr>
-          <a:xfrm>
-            <a:off x="6763761" y="3902378"/>
-            <a:ext cx="4845504" cy="2824906"/>
-          </a:xfrm>
-          <a:prstGeom prst="rect">
-            <a:avLst/>
-          </a:prstGeom>
-        </p:spPr>
-      </p:pic>
-      <p:sp>
-        <p:nvSpPr>
-          <p:cNvPr id="11" name="TextBox 10">
-            <a:extLst>
-              <a:ext uri="{FF2B5EF4-FFF2-40B4-BE49-F238E27FC236}">
-                <a16:creationId xmlns:a16="http://schemas.microsoft.com/office/drawing/2014/main" id="{78326406-B88E-4B76-A56F-1733A929E74A}"/>
-              </a:ext>
-            </a:extLst>
-          </p:cNvPr>
-          <p:cNvSpPr txBox="1"/>
-          <p:nvPr/>
-        </p:nvSpPr>
-        <p:spPr>
-          <a:xfrm>
-            <a:off x="248817" y="4730535"/>
-            <a:ext cx="6096000" cy="1754326"/>
-          </a:xfrm>
-          <a:prstGeom prst="rect">
-            <a:avLst/>
-          </a:prstGeom>
-          <a:noFill/>
-        </p:spPr>
-        <p:txBody>
-          <a:bodyPr wrap="square">
-            <a:spAutoFit/>
-          </a:bodyPr>
-          <a:lstStyle/>
-          <a:p>
-            <a:pPr algn="l"/>
-            <a:r>
-              <a:rPr lang="en-IN" sz="1800" b="1" i="0" u="none" strike="noStrike" baseline="0" dirty="0">
-                <a:latin typeface="Calibri-Bold"/>
-              </a:rPr>
-              <a:t>Observation:</a:t>
-            </a:r>
-          </a:p>
-          <a:p>
-            <a:pPr algn="l"/>
-            <a:r>
-              <a:rPr lang="en-US" sz="1400" b="0" i="0" u="none" strike="noStrike" baseline="0" dirty="0">
-                <a:latin typeface="ArialMT"/>
-              </a:rPr>
-              <a:t>1. </a:t>
-            </a:r>
-            <a:r>
-              <a:rPr lang="en-US" sz="1800" b="0" i="0" u="none" strike="noStrike" baseline="0" dirty="0">
-                <a:latin typeface="Calibri" panose="020F0502020204030204" pitchFamily="34" charset="0"/>
-              </a:rPr>
-              <a:t>Most of the loans have grade of A and B. Therefore stating</a:t>
-            </a:r>
-          </a:p>
-          <a:p>
-            <a:pPr algn="l"/>
-            <a:r>
-              <a:rPr lang="en-US" sz="1800" b="0" i="0" u="none" strike="noStrike" baseline="0" dirty="0">
-                <a:latin typeface="Calibri" panose="020F0502020204030204" pitchFamily="34" charset="0"/>
-              </a:rPr>
-              <a:t>most of the loans are high graded loans.</a:t>
-            </a:r>
-          </a:p>
-          <a:p>
-            <a:pPr algn="l"/>
-            <a:r>
-              <a:rPr lang="en-US" sz="1400" b="0" i="0" u="none" strike="noStrike" baseline="0" dirty="0">
-                <a:latin typeface="ArialMT"/>
-              </a:rPr>
-              <a:t>2. </a:t>
-            </a:r>
-            <a:r>
-              <a:rPr lang="en-US" sz="1800" b="0" i="0" u="none" strike="noStrike" baseline="0" dirty="0">
-                <a:latin typeface="Calibri" panose="020F0502020204030204" pitchFamily="34" charset="0"/>
-              </a:rPr>
-              <a:t>High Quality loans have low interest rate.</a:t>
-            </a:r>
-          </a:p>
-          <a:p>
-            <a:pPr algn="l"/>
-            <a:r>
-              <a:rPr lang="en-US" sz="1400" b="0" i="0" u="none" strike="noStrike" baseline="0" dirty="0">
-                <a:latin typeface="ArialMT"/>
-              </a:rPr>
-              <a:t>3.</a:t>
-            </a:r>
-            <a:r>
-              <a:rPr lang="en-US" sz="1800" b="0" i="0" u="none" strike="noStrike" baseline="0" dirty="0">
-                <a:latin typeface="Calibri" panose="020F0502020204030204" pitchFamily="34" charset="0"/>
-              </a:rPr>
-              <a:t> </a:t>
-            </a:r>
-            <a:r>
-              <a:rPr lang="en-US" dirty="0">
-                <a:latin typeface="Calibri" panose="020F0502020204030204" pitchFamily="34" charset="0"/>
-              </a:rPr>
-              <a:t>H</a:t>
-            </a:r>
-            <a:r>
-              <a:rPr lang="en-US" sz="1800" b="0" i="0" u="none" strike="noStrike" baseline="0" dirty="0">
-                <a:latin typeface="Calibri" panose="020F0502020204030204" pitchFamily="34" charset="0"/>
-              </a:rPr>
-              <a:t>igher interest rate have higher tendency to</a:t>
-            </a:r>
-          </a:p>
-          <a:p>
-            <a:pPr algn="l"/>
-            <a:r>
-              <a:rPr lang="en-IN" sz="1800" b="0" i="0" u="none" strike="noStrike" baseline="0" dirty="0">
-                <a:latin typeface="Calibri" panose="020F0502020204030204" pitchFamily="34" charset="0"/>
-              </a:rPr>
-              <a:t>default the loan</a:t>
-            </a:r>
-            <a:endParaRPr lang="en-IN" dirty="0"/>
-          </a:p>
-        </p:txBody>
-      </p:sp>
     </p:spTree>
     <p:extLst>
       <p:ext uri="{BB962C8B-B14F-4D97-AF65-F5344CB8AC3E}">
-        <p14:creationId xmlns:p14="http://schemas.microsoft.com/office/powerpoint/2010/main" val="1302983225"/>
+        <p14:creationId xmlns:p14="http://schemas.microsoft.com/office/powerpoint/2010/main" val="3095347154"/>
       </p:ext>
     </p:extLst>
   </p:cSld>
@@ -5077,18 +5697,19 @@
         </p:nvSpPr>
         <p:spPr/>
         <p:txBody>
-          <a:bodyPr/>
-          <a:lstStyle/>
-          <a:p>
-            <a:r>
-              <a:rPr lang="en-IN" sz="4000" dirty="0"/>
-              <a:t>Loan Applicants Work Experience Analysis</a:t>
-            </a:r>
+          <a:bodyPr>
+            <a:normAutofit/>
+          </a:bodyPr>
+          <a:lstStyle/>
+          <a:p>
             <a:r>
               <a:rPr lang="en-IN" b="1" dirty="0"/>
               <a:t> </a:t>
             </a:r>
-            <a:endParaRPr lang="en-IN" sz="2800" dirty="0"/>
+            <a:r>
+              <a:rPr lang="en-IN" sz="2800" dirty="0"/>
+              <a:t>Loan Grade Analysis </a:t>
+            </a:r>
           </a:p>
         </p:txBody>
       </p:sp>
@@ -5097,7 +5718,7 @@
           <p:cNvPr id="5" name="Content Placeholder 4">
             <a:extLst>
               <a:ext uri="{FF2B5EF4-FFF2-40B4-BE49-F238E27FC236}">
-                <a16:creationId xmlns:a16="http://schemas.microsoft.com/office/drawing/2014/main" id="{4A794B89-AA2F-488F-A35C-6ECEDB9EE12E}"/>
+                <a16:creationId xmlns:a16="http://schemas.microsoft.com/office/drawing/2014/main" id="{54B3CBCF-29D9-4F51-95DF-4B02FCBD8839}"/>
               </a:ext>
             </a:extLst>
           </p:cNvPr>
@@ -5116,8 +5737,8 @@
         </p:blipFill>
         <p:spPr>
           <a:xfrm>
-            <a:off x="91038" y="1633068"/>
-            <a:ext cx="4916391" cy="2702558"/>
+            <a:off x="709127" y="1496218"/>
+            <a:ext cx="4584136" cy="3305937"/>
           </a:xfrm>
         </p:spPr>
       </p:pic>
@@ -5126,7 +5747,7 @@
           <p:cNvPr id="7" name="Picture 6">
             <a:extLst>
               <a:ext uri="{FF2B5EF4-FFF2-40B4-BE49-F238E27FC236}">
-                <a16:creationId xmlns:a16="http://schemas.microsoft.com/office/drawing/2014/main" id="{540EBF01-F678-4B0A-8F90-71EA1843ACE1}"/>
+                <a16:creationId xmlns:a16="http://schemas.microsoft.com/office/drawing/2014/main" id="{B3592E15-51C0-4786-BBF4-1C66EE8FF696}"/>
               </a:ext>
             </a:extLst>
           </p:cNvPr>
@@ -5143,20 +5764,50 @@
         </p:blipFill>
         <p:spPr>
           <a:xfrm>
-            <a:off x="5224754" y="1418545"/>
-            <a:ext cx="6134100" cy="2848656"/>
+            <a:off x="6769981" y="1155236"/>
+            <a:ext cx="4712892" cy="2632994"/>
           </a:xfrm>
           <a:prstGeom prst="rect">
             <a:avLst/>
           </a:prstGeom>
         </p:spPr>
       </p:pic>
-      <p:sp>
-        <p:nvSpPr>
-          <p:cNvPr id="9" name="TextBox 8">
+      <p:pic>
+        <p:nvPicPr>
+          <p:cNvPr id="9" name="Picture 8">
             <a:extLst>
               <a:ext uri="{FF2B5EF4-FFF2-40B4-BE49-F238E27FC236}">
-                <a16:creationId xmlns:a16="http://schemas.microsoft.com/office/drawing/2014/main" id="{B5B7ADF9-864C-41E1-AFC2-33D7D37A0CB7}"/>
+                <a16:creationId xmlns:a16="http://schemas.microsoft.com/office/drawing/2014/main" id="{77BAF88E-D024-42A0-B881-EAF1ED1EC857}"/>
+              </a:ext>
+            </a:extLst>
+          </p:cNvPr>
+          <p:cNvPicPr>
+            <a:picLocks noChangeAspect="1"/>
+          </p:cNvPicPr>
+          <p:nvPr/>
+        </p:nvPicPr>
+        <p:blipFill>
+          <a:blip r:embed="rId4"/>
+          <a:stretch>
+            <a:fillRect/>
+          </a:stretch>
+        </p:blipFill>
+        <p:spPr>
+          <a:xfrm>
+            <a:off x="6763761" y="3902378"/>
+            <a:ext cx="4845504" cy="2824906"/>
+          </a:xfrm>
+          <a:prstGeom prst="rect">
+            <a:avLst/>
+          </a:prstGeom>
+        </p:spPr>
+      </p:pic>
+      <p:sp>
+        <p:nvSpPr>
+          <p:cNvPr id="11" name="TextBox 10">
+            <a:extLst>
+              <a:ext uri="{FF2B5EF4-FFF2-40B4-BE49-F238E27FC236}">
+                <a16:creationId xmlns:a16="http://schemas.microsoft.com/office/drawing/2014/main" id="{78326406-B88E-4B76-A56F-1733A929E74A}"/>
               </a:ext>
             </a:extLst>
           </p:cNvPr>
@@ -5165,8 +5816,8 @@
         </p:nvSpPr>
         <p:spPr>
           <a:xfrm>
-            <a:off x="435427" y="4972838"/>
-            <a:ext cx="11128311" cy="1200329"/>
+            <a:off x="248817" y="4730535"/>
+            <a:ext cx="6096000" cy="1754326"/>
           </a:xfrm>
           <a:prstGeom prst="rect">
             <a:avLst/>
@@ -5199,7 +5850,16 @@
               <a:rPr lang="en-US" sz="1800" b="0" i="0" u="none" strike="noStrike" baseline="0" dirty="0">
                 <a:latin typeface="Calibri" panose="020F0502020204030204" pitchFamily="34" charset="0"/>
               </a:rPr>
-              <a:t>Majority of employees applying for the loan have more than 10 years of experience</a:t>
+              <a:t>Most of the loans have grade of A and B. Therefore stating</a:t>
+            </a:r>
+          </a:p>
+          <a:p>
+            <a:pPr algn="l"/>
+            <a:r>
+              <a:rPr lang="en-US" sz="1800" b="0" i="0" u="none" strike="noStrike" baseline="0" dirty="0">
+                <a:latin typeface="Calibri" panose="020F0502020204030204" pitchFamily="34" charset="0"/>
+              </a:rPr>
+              <a:t>most of the loans are high graded loans.</a:t>
             </a:r>
           </a:p>
           <a:p>
@@ -5214,16 +5874,43 @@
               <a:rPr lang="en-US" sz="1800" b="0" i="0" u="none" strike="noStrike" baseline="0" dirty="0">
                 <a:latin typeface="Calibri" panose="020F0502020204030204" pitchFamily="34" charset="0"/>
               </a:rPr>
-              <a:t>Tendency of person to default the loan with 10 years of experience is also high. So company need to be careful</a:t>
+              <a:t>High Quality loans have low interest rate.</a:t>
             </a:r>
           </a:p>
           <a:p>
             <a:pPr algn="l"/>
             <a:r>
-              <a:rPr lang="en-IN" sz="1800" b="0" i="0" u="none" strike="noStrike" baseline="0">
+              <a:rPr lang="en-US" sz="1400" b="0" i="0" u="none" strike="noStrike" baseline="0" dirty="0">
+                <a:latin typeface="ArialMT"/>
+              </a:rPr>
+              <a:t>3.</a:t>
+            </a:r>
+            <a:r>
+              <a:rPr lang="en-US" sz="1800" b="0" i="0" u="none" strike="noStrike" baseline="0" dirty="0">
                 <a:latin typeface="Calibri" panose="020F0502020204030204" pitchFamily="34" charset="0"/>
               </a:rPr>
-              <a:t>     when granting loan.</a:t>
+              <a:t> </a:t>
+            </a:r>
+            <a:r>
+              <a:rPr lang="en-US" dirty="0">
+                <a:latin typeface="Calibri" panose="020F0502020204030204" pitchFamily="34" charset="0"/>
+              </a:rPr>
+              <a:t>H</a:t>
+            </a:r>
+            <a:r>
+              <a:rPr lang="en-US" sz="1800" b="0" i="0" u="none" strike="noStrike" baseline="0" dirty="0">
+                <a:latin typeface="Calibri" panose="020F0502020204030204" pitchFamily="34" charset="0"/>
+              </a:rPr>
+              <a:t>igher interest rate have higher tendency to</a:t>
+            </a:r>
+          </a:p>
+          <a:p>
+            <a:pPr algn="l"/>
+            <a:r>
+              <a:rPr lang="en-IN" sz="1800" b="0" i="0" u="none" strike="noStrike" baseline="0" dirty="0">
+                <a:latin typeface="Calibri" panose="020F0502020204030204" pitchFamily="34" charset="0"/>
+              </a:rPr>
+              <a:t>default the loan</a:t>
             </a:r>
             <a:endParaRPr lang="en-IN" dirty="0"/>
           </a:p>
@@ -5232,7 +5919,7 @@
     </p:spTree>
     <p:extLst>
       <p:ext uri="{BB962C8B-B14F-4D97-AF65-F5344CB8AC3E}">
-        <p14:creationId xmlns:p14="http://schemas.microsoft.com/office/powerpoint/2010/main" val="567511567"/>
+        <p14:creationId xmlns:p14="http://schemas.microsoft.com/office/powerpoint/2010/main" val="1302983225"/>
       </p:ext>
     </p:extLst>
   </p:cSld>
@@ -5275,41 +5962,158 @@
           <a:lstStyle/>
           <a:p>
             <a:r>
-              <a:rPr lang="en-IN" sz="2800" dirty="0"/>
-              <a:t> Analysis</a:t>
-            </a:r>
-          </a:p>
-        </p:txBody>
-      </p:sp>
-      <p:sp>
-        <p:nvSpPr>
-          <p:cNvPr id="4" name="Content Placeholder 3">
+              <a:rPr lang="en-IN" sz="4000" dirty="0"/>
+              <a:t>Loan Applicants Work Experience Analysis</a:t>
+            </a:r>
+            <a:r>
+              <a:rPr lang="en-IN" b="1" dirty="0"/>
+              <a:t> </a:t>
+            </a:r>
+            <a:endParaRPr lang="en-IN" sz="2800" dirty="0"/>
+          </a:p>
+        </p:txBody>
+      </p:sp>
+      <p:pic>
+        <p:nvPicPr>
+          <p:cNvPr id="5" name="Content Placeholder 4">
             <a:extLst>
               <a:ext uri="{FF2B5EF4-FFF2-40B4-BE49-F238E27FC236}">
-                <a16:creationId xmlns:a16="http://schemas.microsoft.com/office/drawing/2014/main" id="{2CFE4B77-DC67-4641-91BC-DD355A315C79}"/>
+                <a16:creationId xmlns:a16="http://schemas.microsoft.com/office/drawing/2014/main" id="{4A794B89-AA2F-488F-A35C-6ECEDB9EE12E}"/>
               </a:ext>
             </a:extLst>
           </p:cNvPr>
-          <p:cNvSpPr>
-            <a:spLocks noGrp="1"/>
-          </p:cNvSpPr>
+          <p:cNvPicPr>
+            <a:picLocks noGrp="1" noChangeAspect="1"/>
+          </p:cNvPicPr>
           <p:nvPr>
             <p:ph idx="1"/>
           </p:nvPr>
-        </p:nvSpPr>
-        <p:spPr/>
-        <p:txBody>
-          <a:bodyPr/>
-          <a:lstStyle/>
-          <a:p>
-            <a:endParaRPr lang="en-IN"/>
+        </p:nvPicPr>
+        <p:blipFill>
+          <a:blip r:embed="rId2"/>
+          <a:stretch>
+            <a:fillRect/>
+          </a:stretch>
+        </p:blipFill>
+        <p:spPr>
+          <a:xfrm>
+            <a:off x="91038" y="1633068"/>
+            <a:ext cx="4916391" cy="2702558"/>
+          </a:xfrm>
+        </p:spPr>
+      </p:pic>
+      <p:pic>
+        <p:nvPicPr>
+          <p:cNvPr id="7" name="Picture 6">
+            <a:extLst>
+              <a:ext uri="{FF2B5EF4-FFF2-40B4-BE49-F238E27FC236}">
+                <a16:creationId xmlns:a16="http://schemas.microsoft.com/office/drawing/2014/main" id="{540EBF01-F678-4B0A-8F90-71EA1843ACE1}"/>
+              </a:ext>
+            </a:extLst>
+          </p:cNvPr>
+          <p:cNvPicPr>
+            <a:picLocks noChangeAspect="1"/>
+          </p:cNvPicPr>
+          <p:nvPr/>
+        </p:nvPicPr>
+        <p:blipFill>
+          <a:blip r:embed="rId3"/>
+          <a:stretch>
+            <a:fillRect/>
+          </a:stretch>
+        </p:blipFill>
+        <p:spPr>
+          <a:xfrm>
+            <a:off x="5224754" y="1418545"/>
+            <a:ext cx="6134100" cy="2848656"/>
+          </a:xfrm>
+          <a:prstGeom prst="rect">
+            <a:avLst/>
+          </a:prstGeom>
+        </p:spPr>
+      </p:pic>
+      <p:sp>
+        <p:nvSpPr>
+          <p:cNvPr id="9" name="TextBox 8">
+            <a:extLst>
+              <a:ext uri="{FF2B5EF4-FFF2-40B4-BE49-F238E27FC236}">
+                <a16:creationId xmlns:a16="http://schemas.microsoft.com/office/drawing/2014/main" id="{B5B7ADF9-864C-41E1-AFC2-33D7D37A0CB7}"/>
+              </a:ext>
+            </a:extLst>
+          </p:cNvPr>
+          <p:cNvSpPr txBox="1"/>
+          <p:nvPr/>
+        </p:nvSpPr>
+        <p:spPr>
+          <a:xfrm>
+            <a:off x="435427" y="4972838"/>
+            <a:ext cx="11128311" cy="1200329"/>
+          </a:xfrm>
+          <a:prstGeom prst="rect">
+            <a:avLst/>
+          </a:prstGeom>
+          <a:noFill/>
+        </p:spPr>
+        <p:txBody>
+          <a:bodyPr wrap="square">
+            <a:spAutoFit/>
+          </a:bodyPr>
+          <a:lstStyle/>
+          <a:p>
+            <a:pPr algn="l"/>
+            <a:r>
+              <a:rPr lang="en-IN" sz="1800" b="1" i="0" u="none" strike="noStrike" baseline="0" dirty="0">
+                <a:latin typeface="Calibri-Bold"/>
+              </a:rPr>
+              <a:t>Observation:</a:t>
+            </a:r>
+          </a:p>
+          <a:p>
+            <a:pPr algn="l"/>
+            <a:r>
+              <a:rPr lang="en-US" sz="1400" b="0" i="0" u="none" strike="noStrike" baseline="0" dirty="0">
+                <a:latin typeface="ArialMT"/>
+              </a:rPr>
+              <a:t>1. </a:t>
+            </a:r>
+            <a:r>
+              <a:rPr lang="en-US" sz="1800" b="0" i="0" u="none" strike="noStrike" baseline="0" dirty="0">
+                <a:latin typeface="Calibri" panose="020F0502020204030204" pitchFamily="34" charset="0"/>
+              </a:rPr>
+              <a:t>Majority of employees applying for the loan have more than 10 years of experience</a:t>
+            </a:r>
+          </a:p>
+          <a:p>
+            <a:pPr algn="l"/>
+            <a:r>
+              <a:rPr lang="en-US" sz="1400" b="0" i="0" u="none" strike="noStrike" baseline="0" dirty="0">
+                <a:latin typeface="ArialMT"/>
+              </a:rPr>
+              <a:t>2. </a:t>
+            </a:r>
+            <a:r>
+              <a:rPr lang="en-US" sz="1800" b="0" i="0" u="none" strike="noStrike" baseline="0" dirty="0">
+                <a:latin typeface="Calibri" panose="020F0502020204030204" pitchFamily="34" charset="0"/>
+              </a:rPr>
+              <a:t>Tendency of person to default the loan with 10 years of experience is also high. So company need to be careful</a:t>
+            </a:r>
+          </a:p>
+          <a:p>
+            <a:pPr algn="l"/>
+            <a:r>
+              <a:rPr lang="en-IN" sz="1800" b="0" i="0" u="none" strike="noStrike" baseline="0">
+                <a:latin typeface="Calibri" panose="020F0502020204030204" pitchFamily="34" charset="0"/>
+              </a:rPr>
+              <a:t>     when granting loan.</a:t>
+            </a:r>
+            <a:endParaRPr lang="en-IN" dirty="0"/>
           </a:p>
         </p:txBody>
       </p:sp>
     </p:spTree>
     <p:extLst>
       <p:ext uri="{BB962C8B-B14F-4D97-AF65-F5344CB8AC3E}">
-        <p14:creationId xmlns:p14="http://schemas.microsoft.com/office/powerpoint/2010/main" val="3584251631"/>
+        <p14:creationId xmlns:p14="http://schemas.microsoft.com/office/powerpoint/2010/main" val="567511567"/>
       </p:ext>
     </p:extLst>
   </p:cSld>
@@ -5348,7 +6152,7 @@
         </p:nvSpPr>
         <p:spPr>
           <a:xfrm>
-            <a:off x="1136469" y="640080"/>
+            <a:off x="1590559" y="758267"/>
             <a:ext cx="9313817" cy="856138"/>
           </a:xfrm>
         </p:spPr>
@@ -5356,31 +6160,125 @@
           <a:bodyPr/>
           <a:lstStyle/>
           <a:p>
+            <a:r>
+              <a:rPr lang="en-US" sz="2800" dirty="0"/>
+              <a:t>Loan Applicant’s Annual Income Analysis</a:t>
+            </a:r>
             <a:endParaRPr lang="en-IN" sz="2800" dirty="0"/>
           </a:p>
         </p:txBody>
       </p:sp>
-      <p:sp>
-        <p:nvSpPr>
+      <p:pic>
+        <p:nvPicPr>
           <p:cNvPr id="3" name="Content Placeholder 2">
             <a:extLst>
               <a:ext uri="{FF2B5EF4-FFF2-40B4-BE49-F238E27FC236}">
-                <a16:creationId xmlns:a16="http://schemas.microsoft.com/office/drawing/2014/main" id="{E201345B-8B11-43C7-BF0B-791F4B83C75F}"/>
+                <a16:creationId xmlns:a16="http://schemas.microsoft.com/office/drawing/2014/main" id="{37C99B09-66D8-47EC-A80A-08CD9424C43B}"/>
               </a:ext>
             </a:extLst>
           </p:cNvPr>
-          <p:cNvSpPr>
-            <a:spLocks noGrp="1"/>
-          </p:cNvSpPr>
+          <p:cNvPicPr>
+            <a:picLocks noGrp="1" noChangeAspect="1"/>
+          </p:cNvPicPr>
           <p:nvPr>
             <p:ph idx="1"/>
           </p:nvPr>
-        </p:nvSpPr>
-        <p:spPr/>
-        <p:txBody>
-          <a:bodyPr/>
-          <a:lstStyle/>
-          <a:p>
+        </p:nvPicPr>
+        <p:blipFill>
+          <a:blip r:embed="rId2"/>
+          <a:stretch>
+            <a:fillRect/>
+          </a:stretch>
+        </p:blipFill>
+        <p:spPr>
+          <a:xfrm>
+            <a:off x="6476211" y="1716272"/>
+            <a:ext cx="4731481" cy="3081264"/>
+          </a:xfrm>
+        </p:spPr>
+      </p:pic>
+      <p:pic>
+        <p:nvPicPr>
+          <p:cNvPr id="7" name="Picture 6">
+            <a:extLst>
+              <a:ext uri="{FF2B5EF4-FFF2-40B4-BE49-F238E27FC236}">
+                <a16:creationId xmlns:a16="http://schemas.microsoft.com/office/drawing/2014/main" id="{9D4176CE-E456-42CA-B6AA-C828153813DA}"/>
+              </a:ext>
+            </a:extLst>
+          </p:cNvPr>
+          <p:cNvPicPr>
+            <a:picLocks noChangeAspect="1"/>
+          </p:cNvPicPr>
+          <p:nvPr/>
+        </p:nvPicPr>
+        <p:blipFill>
+          <a:blip r:embed="rId3"/>
+          <a:stretch>
+            <a:fillRect/>
+          </a:stretch>
+        </p:blipFill>
+        <p:spPr>
+          <a:xfrm>
+            <a:off x="603917" y="1698808"/>
+            <a:ext cx="4672537" cy="2923526"/>
+          </a:xfrm>
+          <a:prstGeom prst="rect">
+            <a:avLst/>
+          </a:prstGeom>
+        </p:spPr>
+      </p:pic>
+      <p:sp>
+        <p:nvSpPr>
+          <p:cNvPr id="8" name="TextBox 7">
+            <a:extLst>
+              <a:ext uri="{FF2B5EF4-FFF2-40B4-BE49-F238E27FC236}">
+                <a16:creationId xmlns:a16="http://schemas.microsoft.com/office/drawing/2014/main" id="{6D3DA1E1-8702-4BC9-A0F8-189B7A360EE8}"/>
+              </a:ext>
+            </a:extLst>
+          </p:cNvPr>
+          <p:cNvSpPr txBox="1"/>
+          <p:nvPr/>
+        </p:nvSpPr>
+        <p:spPr>
+          <a:xfrm>
+            <a:off x="671030" y="4899404"/>
+            <a:ext cx="10461162" cy="1200329"/>
+          </a:xfrm>
+          <a:prstGeom prst="rect">
+            <a:avLst/>
+          </a:prstGeom>
+          <a:noFill/>
+        </p:spPr>
+        <p:txBody>
+          <a:bodyPr wrap="square" rtlCol="0">
+            <a:spAutoFit/>
+          </a:bodyPr>
+          <a:lstStyle/>
+          <a:p>
+            <a:r>
+              <a:rPr lang="en-US" dirty="0"/>
+              <a:t>Observations:</a:t>
+            </a:r>
+          </a:p>
+          <a:p>
+            <a:pPr marL="285750" indent="-285750">
+              <a:buFontTx/>
+              <a:buChar char="-"/>
+            </a:pPr>
+            <a:r>
+              <a:rPr lang="en-US" dirty="0"/>
+              <a:t>The number of loans are higher for under the 100000 annual income</a:t>
+            </a:r>
+          </a:p>
+          <a:p>
+            <a:pPr marL="285750" indent="-285750">
+              <a:buFontTx/>
+              <a:buChar char="-"/>
+            </a:pPr>
+            <a:r>
+              <a:rPr lang="en-US" dirty="0"/>
+              <a:t>The number of defaulters are also higher in this segment. But this could be because of the higher number of loans and may not be a driving factor for the defaulters.</a:t>
+            </a:r>
             <a:endParaRPr lang="en-IN" dirty="0"/>
           </a:p>
         </p:txBody>
@@ -5388,7 +6286,7 @@
     </p:spTree>
     <p:extLst>
       <p:ext uri="{BB962C8B-B14F-4D97-AF65-F5344CB8AC3E}">
-        <p14:creationId xmlns:p14="http://schemas.microsoft.com/office/powerpoint/2010/main" val="1739856806"/>
+        <p14:creationId xmlns:p14="http://schemas.microsoft.com/office/powerpoint/2010/main" val="3733554285"/>
       </p:ext>
     </p:extLst>
   </p:cSld>
@@ -5427,7 +6325,7 @@
         </p:nvSpPr>
         <p:spPr>
           <a:xfrm>
-            <a:off x="1590559" y="758267"/>
+            <a:off x="1136469" y="640080"/>
             <a:ext cx="9313817" cy="856138"/>
           </a:xfrm>
         </p:spPr>
@@ -5435,36 +6333,111 @@
           <a:bodyPr/>
           <a:lstStyle/>
           <a:p>
+            <a:r>
+              <a:rPr lang="en-US" sz="2800" dirty="0"/>
+              <a:t>Purpose of Loan Analysis</a:t>
+            </a:r>
             <a:endParaRPr lang="en-IN" sz="2800" dirty="0"/>
           </a:p>
         </p:txBody>
       </p:sp>
-      <p:sp>
-        <p:nvSpPr>
-          <p:cNvPr id="5" name="Content Placeholder 2">
+      <p:pic>
+        <p:nvPicPr>
+          <p:cNvPr id="4" name="Content Placeholder 3">
             <a:extLst>
               <a:ext uri="{FF2B5EF4-FFF2-40B4-BE49-F238E27FC236}">
-                <a16:creationId xmlns:a16="http://schemas.microsoft.com/office/drawing/2014/main" id="{77E62ADF-9F52-4005-9E3A-3DD7E4E58BDB}"/>
+                <a16:creationId xmlns:a16="http://schemas.microsoft.com/office/drawing/2014/main" id="{2360E5DC-9EE8-4FF3-B9C4-267E5992EC63}"/>
               </a:ext>
             </a:extLst>
           </p:cNvPr>
-          <p:cNvSpPr>
-            <a:spLocks noGrp="1"/>
-          </p:cNvSpPr>
+          <p:cNvPicPr>
+            <a:picLocks noGrp="1" noChangeAspect="1"/>
+          </p:cNvPicPr>
           <p:nvPr>
             <p:ph idx="1"/>
           </p:nvPr>
-        </p:nvSpPr>
-        <p:spPr>
-          <a:xfrm>
-            <a:off x="404949" y="1854926"/>
-            <a:ext cx="11168742" cy="4344261"/>
-          </a:xfrm>
-        </p:spPr>
-        <p:txBody>
-          <a:bodyPr/>
-          <a:lstStyle/>
-          <a:p>
+        </p:nvPicPr>
+        <p:blipFill>
+          <a:blip r:embed="rId2"/>
+          <a:stretch>
+            <a:fillRect/>
+          </a:stretch>
+        </p:blipFill>
+        <p:spPr>
+          <a:xfrm>
+            <a:off x="881349" y="1885734"/>
+            <a:ext cx="3917153" cy="3477145"/>
+          </a:xfrm>
+        </p:spPr>
+      </p:pic>
+      <p:pic>
+        <p:nvPicPr>
+          <p:cNvPr id="7" name="Picture 6">
+            <a:extLst>
+              <a:ext uri="{FF2B5EF4-FFF2-40B4-BE49-F238E27FC236}">
+                <a16:creationId xmlns:a16="http://schemas.microsoft.com/office/drawing/2014/main" id="{B54C546B-4435-4DE2-94F5-0DED9D05B8D5}"/>
+              </a:ext>
+            </a:extLst>
+          </p:cNvPr>
+          <p:cNvPicPr>
+            <a:picLocks noChangeAspect="1"/>
+          </p:cNvPicPr>
+          <p:nvPr/>
+        </p:nvPicPr>
+        <p:blipFill>
+          <a:blip r:embed="rId3"/>
+          <a:stretch>
+            <a:fillRect/>
+          </a:stretch>
+        </p:blipFill>
+        <p:spPr>
+          <a:xfrm>
+            <a:off x="5125672" y="1818860"/>
+            <a:ext cx="6512653" cy="3590661"/>
+          </a:xfrm>
+          <a:prstGeom prst="rect">
+            <a:avLst/>
+          </a:prstGeom>
+        </p:spPr>
+      </p:pic>
+      <p:sp>
+        <p:nvSpPr>
+          <p:cNvPr id="8" name="TextBox 7">
+            <a:extLst>
+              <a:ext uri="{FF2B5EF4-FFF2-40B4-BE49-F238E27FC236}">
+                <a16:creationId xmlns:a16="http://schemas.microsoft.com/office/drawing/2014/main" id="{425D4BED-E098-46D0-B57D-F6533BF8E325}"/>
+              </a:ext>
+            </a:extLst>
+          </p:cNvPr>
+          <p:cNvSpPr txBox="1"/>
+          <p:nvPr/>
+        </p:nvSpPr>
+        <p:spPr>
+          <a:xfrm flipH="1">
+            <a:off x="881349" y="5637402"/>
+            <a:ext cx="10334732" cy="923330"/>
+          </a:xfrm>
+          <a:prstGeom prst="rect">
+            <a:avLst/>
+          </a:prstGeom>
+          <a:noFill/>
+        </p:spPr>
+        <p:txBody>
+          <a:bodyPr wrap="square" rtlCol="0">
+            <a:spAutoFit/>
+          </a:bodyPr>
+          <a:lstStyle/>
+          <a:p>
+            <a:r>
+              <a:rPr lang="en-US" dirty="0"/>
+              <a:t>Observation:</a:t>
+            </a:r>
+          </a:p>
+          <a:p>
+            <a:r>
+              <a:rPr lang="en-US" dirty="0"/>
+              <a:t>- Debt consolidation has the highest number of loans. It also has the highest number of defaulters. This is some thing to look out for new applicants.</a:t>
+            </a:r>
             <a:endParaRPr lang="en-IN" dirty="0"/>
           </a:p>
         </p:txBody>
@@ -5472,7 +6445,7 @@
     </p:spTree>
     <p:extLst>
       <p:ext uri="{BB962C8B-B14F-4D97-AF65-F5344CB8AC3E}">
-        <p14:creationId xmlns:p14="http://schemas.microsoft.com/office/powerpoint/2010/main" val="3733554285"/>
+        <p14:creationId xmlns:p14="http://schemas.microsoft.com/office/powerpoint/2010/main" val="1739856806"/>
       </p:ext>
     </p:extLst>
   </p:cSld>

</xml_diff>